<commit_message>
j'ai ajouté quelque correction sur tableau de fonctionnement
</commit_message>
<xml_diff>
--- a/ProtaSite nearly ready/diagrame_fonctionnementProtaBase.pptx
+++ b/ProtaSite nearly ready/diagrame_fonctionnementProtaBase.pptx
@@ -289,7 +289,7 @@
             <a:fld id="{0D27EC15-95A9-4BA2-9BC9-87E89AF03908}" type="datetimeFigureOut">
               <a:rPr lang="fr-FR" smtClean="0"/>
               <a:pPr/>
-              <a:t>11/10/2021</a:t>
+              <a:t>15/10/2021</a:t>
             </a:fld>
             <a:endParaRPr lang="fr-FR"/>
           </a:p>
@@ -456,7 +456,7 @@
             <a:fld id="{0D27EC15-95A9-4BA2-9BC9-87E89AF03908}" type="datetimeFigureOut">
               <a:rPr lang="fr-FR" smtClean="0"/>
               <a:pPr/>
-              <a:t>11/10/2021</a:t>
+              <a:t>15/10/2021</a:t>
             </a:fld>
             <a:endParaRPr lang="fr-FR"/>
           </a:p>
@@ -633,7 +633,7 @@
             <a:fld id="{0D27EC15-95A9-4BA2-9BC9-87E89AF03908}" type="datetimeFigureOut">
               <a:rPr lang="fr-FR" smtClean="0"/>
               <a:pPr/>
-              <a:t>11/10/2021</a:t>
+              <a:t>15/10/2021</a:t>
             </a:fld>
             <a:endParaRPr lang="fr-FR"/>
           </a:p>
@@ -800,7 +800,7 @@
             <a:fld id="{0D27EC15-95A9-4BA2-9BC9-87E89AF03908}" type="datetimeFigureOut">
               <a:rPr lang="fr-FR" smtClean="0"/>
               <a:pPr/>
-              <a:t>11/10/2021</a:t>
+              <a:t>15/10/2021</a:t>
             </a:fld>
             <a:endParaRPr lang="fr-FR"/>
           </a:p>
@@ -1043,7 +1043,7 @@
             <a:fld id="{0D27EC15-95A9-4BA2-9BC9-87E89AF03908}" type="datetimeFigureOut">
               <a:rPr lang="fr-FR" smtClean="0"/>
               <a:pPr/>
-              <a:t>11/10/2021</a:t>
+              <a:t>15/10/2021</a:t>
             </a:fld>
             <a:endParaRPr lang="fr-FR"/>
           </a:p>
@@ -1328,7 +1328,7 @@
             <a:fld id="{0D27EC15-95A9-4BA2-9BC9-87E89AF03908}" type="datetimeFigureOut">
               <a:rPr lang="fr-FR" smtClean="0"/>
               <a:pPr/>
-              <a:t>11/10/2021</a:t>
+              <a:t>15/10/2021</a:t>
             </a:fld>
             <a:endParaRPr lang="fr-FR"/>
           </a:p>
@@ -1747,7 +1747,7 @@
             <a:fld id="{0D27EC15-95A9-4BA2-9BC9-87E89AF03908}" type="datetimeFigureOut">
               <a:rPr lang="fr-FR" smtClean="0"/>
               <a:pPr/>
-              <a:t>11/10/2021</a:t>
+              <a:t>15/10/2021</a:t>
             </a:fld>
             <a:endParaRPr lang="fr-FR"/>
           </a:p>
@@ -1862,7 +1862,7 @@
             <a:fld id="{0D27EC15-95A9-4BA2-9BC9-87E89AF03908}" type="datetimeFigureOut">
               <a:rPr lang="fr-FR" smtClean="0"/>
               <a:pPr/>
-              <a:t>11/10/2021</a:t>
+              <a:t>15/10/2021</a:t>
             </a:fld>
             <a:endParaRPr lang="fr-FR"/>
           </a:p>
@@ -1954,7 +1954,7 @@
             <a:fld id="{0D27EC15-95A9-4BA2-9BC9-87E89AF03908}" type="datetimeFigureOut">
               <a:rPr lang="fr-FR" smtClean="0"/>
               <a:pPr/>
-              <a:t>11/10/2021</a:t>
+              <a:t>15/10/2021</a:t>
             </a:fld>
             <a:endParaRPr lang="fr-FR"/>
           </a:p>
@@ -2228,7 +2228,7 @@
             <a:fld id="{0D27EC15-95A9-4BA2-9BC9-87E89AF03908}" type="datetimeFigureOut">
               <a:rPr lang="fr-FR" smtClean="0"/>
               <a:pPr/>
-              <a:t>11/10/2021</a:t>
+              <a:t>15/10/2021</a:t>
             </a:fld>
             <a:endParaRPr lang="fr-FR"/>
           </a:p>
@@ -2478,7 +2478,7 @@
             <a:fld id="{0D27EC15-95A9-4BA2-9BC9-87E89AF03908}" type="datetimeFigureOut">
               <a:rPr lang="fr-FR" smtClean="0"/>
               <a:pPr/>
-              <a:t>11/10/2021</a:t>
+              <a:t>15/10/2021</a:t>
             </a:fld>
             <a:endParaRPr lang="fr-FR"/>
           </a:p>
@@ -2688,7 +2688,7 @@
             <a:fld id="{0D27EC15-95A9-4BA2-9BC9-87E89AF03908}" type="datetimeFigureOut">
               <a:rPr lang="fr-FR" smtClean="0"/>
               <a:pPr/>
-              <a:t>11/10/2021</a:t>
+              <a:t>15/10/2021</a:t>
             </a:fld>
             <a:endParaRPr lang="fr-FR"/>
           </a:p>
@@ -3623,23 +3623,7 @@
                   <a:schemeClr val="tx1"/>
                 </a:solidFill>
               </a:rPr>
-              <a:t>Via scan du </a:t>
-            </a:r>
-            <a:r>
-              <a:rPr lang="fr-FR" sz="1500" dirty="0" smtClean="0">
-                <a:solidFill>
-                  <a:schemeClr val="tx1"/>
-                </a:solidFill>
-              </a:rPr>
-              <a:t>QR Code/code </a:t>
-            </a:r>
-            <a:r>
-              <a:rPr lang="fr-FR" sz="1500" dirty="0" smtClean="0">
-                <a:solidFill>
-                  <a:schemeClr val="tx1"/>
-                </a:solidFill>
-              </a:rPr>
-              <a:t>bar</a:t>
+              <a:t>Via scan du QR Code/code bar</a:t>
             </a:r>
             <a:endParaRPr lang="fr-FR" sz="1500" dirty="0">
               <a:solidFill>
@@ -4020,15 +4004,7 @@
                   <a:schemeClr val="tx1"/>
                 </a:solidFill>
               </a:rPr>
-              <a:t>Si inscription </a:t>
-            </a:r>
-            <a:r>
-              <a:rPr lang="fr-FR" sz="1500" dirty="0" smtClean="0">
-                <a:solidFill>
-                  <a:schemeClr val="tx1"/>
-                </a:solidFill>
-              </a:rPr>
-              <a:t>docteur/ADMIN</a:t>
+              <a:t>Si inscription docteur/ADMIN</a:t>
             </a:r>
             <a:endParaRPr lang="fr-FR" sz="1500" dirty="0">
               <a:solidFill>
@@ -4718,6 +4694,132 @@
           </a:fontRef>
         </p:style>
       </p:cxnSp>
+      <p:cxnSp>
+        <p:nvCxnSpPr>
+          <p:cNvPr id="39" name="Connecteur en angle 84"/>
+          <p:cNvCxnSpPr>
+            <a:stCxn id="55" idx="2"/>
+            <a:endCxn id="4" idx="1"/>
+          </p:cNvCxnSpPr>
+          <p:nvPr/>
+        </p:nvCxnSpPr>
+        <p:spPr>
+          <a:xfrm rot="5400000" flipH="1">
+            <a:off x="1288389" y="-250286"/>
+            <a:ext cx="1634673" cy="3132348"/>
+          </a:xfrm>
+          <a:prstGeom prst="bentConnector4">
+            <a:avLst>
+              <a:gd name="adj1" fmla="val -13984"/>
+              <a:gd name="adj2" fmla="val 107298"/>
+            </a:avLst>
+          </a:prstGeom>
+          <a:ln w="28575">
+            <a:solidFill>
+              <a:schemeClr val="accent2"/>
+            </a:solidFill>
+            <a:tailEnd type="arrow"/>
+          </a:ln>
+        </p:spPr>
+        <p:style>
+          <a:lnRef idx="1">
+            <a:schemeClr val="accent1"/>
+          </a:lnRef>
+          <a:fillRef idx="0">
+            <a:schemeClr val="accent1"/>
+          </a:fillRef>
+          <a:effectRef idx="0">
+            <a:schemeClr val="accent1"/>
+          </a:effectRef>
+          <a:fontRef idx="minor">
+            <a:schemeClr val="tx1"/>
+          </a:fontRef>
+        </p:style>
+      </p:cxnSp>
+      <p:sp>
+        <p:nvSpPr>
+          <p:cNvPr id="44" name="ZoneTexte 43"/>
+          <p:cNvSpPr txBox="1"/>
+          <p:nvPr/>
+        </p:nvSpPr>
+        <p:spPr>
+          <a:xfrm>
+            <a:off x="4860032" y="1412776"/>
+            <a:ext cx="571003" cy="323165"/>
+          </a:xfrm>
+          <a:prstGeom prst="rect">
+            <a:avLst/>
+          </a:prstGeom>
+          <a:noFill/>
+        </p:spPr>
+        <p:txBody>
+          <a:bodyPr wrap="square" rtlCol="0">
+            <a:spAutoFit/>
+          </a:bodyPr>
+          <a:lstStyle/>
+          <a:p>
+            <a:r>
+              <a:rPr lang="fr-FR" sz="1500" dirty="0" smtClean="0">
+                <a:solidFill>
+                  <a:schemeClr val="accent3">
+                    <a:lumMod val="50000"/>
+                  </a:schemeClr>
+                </a:solidFill>
+              </a:rPr>
+              <a:t>oui</a:t>
+            </a:r>
+            <a:endParaRPr lang="fr-FR" sz="1500" dirty="0">
+              <a:solidFill>
+                <a:schemeClr val="accent3">
+                  <a:lumMod val="50000"/>
+                </a:schemeClr>
+              </a:solidFill>
+            </a:endParaRPr>
+          </a:p>
+        </p:txBody>
+      </p:sp>
+      <p:sp>
+        <p:nvSpPr>
+          <p:cNvPr id="45" name="ZoneTexte 44"/>
+          <p:cNvSpPr txBox="1"/>
+          <p:nvPr/>
+        </p:nvSpPr>
+        <p:spPr>
+          <a:xfrm>
+            <a:off x="3203848" y="2060848"/>
+            <a:ext cx="571003" cy="323165"/>
+          </a:xfrm>
+          <a:prstGeom prst="rect">
+            <a:avLst/>
+          </a:prstGeom>
+          <a:noFill/>
+        </p:spPr>
+        <p:txBody>
+          <a:bodyPr wrap="square" rtlCol="0">
+            <a:spAutoFit/>
+          </a:bodyPr>
+          <a:lstStyle/>
+          <a:p>
+            <a:r>
+              <a:rPr lang="fr-FR" sz="1500" dirty="0" smtClean="0">
+                <a:solidFill>
+                  <a:schemeClr val="accent3">
+                    <a:lumMod val="50000"/>
+                  </a:schemeClr>
+                </a:solidFill>
+              </a:rPr>
+              <a:t>non</a:t>
+            </a:r>
+            <a:endParaRPr lang="fr-FR" sz="1500" dirty="0">
+              <a:solidFill>
+                <a:schemeClr val="accent3">
+                  <a:lumMod val="50000"/>
+                </a:schemeClr>
+              </a:solidFill>
+            </a:endParaRPr>
+          </a:p>
+        </p:txBody>
+      </p:sp>
     </p:spTree>
   </p:cSld>
   <p:clrMapOvr>

</xml_diff>